<commit_message>
Started work on images
</commit_message>
<xml_diff>
--- a/Presentations/Open Repositories 2015/ORCommunities24x36.pptx
+++ b/Presentations/Open Repositories 2015/ORCommunities24x36.pptx
@@ -195,7 +195,7 @@
           <a:p>
             <a:fld id="{70685992-2584-0D40-9F4F-6E4B59BEC887}" type="datetimeFigureOut">
               <a:rPr lang="en-US" smtClean="0"/>
-              <a:t>5/13/15</a:t>
+              <a:t>5/18/15</a:t>
             </a:fld>
             <a:endParaRPr lang="en-US"/>
           </a:p>
@@ -1043,7 +1043,7 @@
           <a:p>
             <a:fld id="{D968744C-CFB2-7D43-BF8E-20D9B6CB77D5}" type="datetimeFigureOut">
               <a:rPr lang="en-US" smtClean="0"/>
-              <a:t>5/13/15</a:t>
+              <a:t>5/18/15</a:t>
             </a:fld>
             <a:endParaRPr lang="en-US"/>
           </a:p>
@@ -1213,7 +1213,7 @@
           <a:p>
             <a:fld id="{D968744C-CFB2-7D43-BF8E-20D9B6CB77D5}" type="datetimeFigureOut">
               <a:rPr lang="en-US" smtClean="0"/>
-              <a:t>5/13/15</a:t>
+              <a:t>5/18/15</a:t>
             </a:fld>
             <a:endParaRPr lang="en-US"/>
           </a:p>
@@ -1393,7 +1393,7 @@
           <a:p>
             <a:fld id="{D968744C-CFB2-7D43-BF8E-20D9B6CB77D5}" type="datetimeFigureOut">
               <a:rPr lang="en-US" smtClean="0"/>
-              <a:t>5/13/15</a:t>
+              <a:t>5/18/15</a:t>
             </a:fld>
             <a:endParaRPr lang="en-US"/>
           </a:p>
@@ -1563,7 +1563,7 @@
           <a:p>
             <a:fld id="{D968744C-CFB2-7D43-BF8E-20D9B6CB77D5}" type="datetimeFigureOut">
               <a:rPr lang="en-US" smtClean="0"/>
-              <a:t>5/13/15</a:t>
+              <a:t>5/18/15</a:t>
             </a:fld>
             <a:endParaRPr lang="en-US"/>
           </a:p>
@@ -1809,7 +1809,7 @@
           <a:p>
             <a:fld id="{D968744C-CFB2-7D43-BF8E-20D9B6CB77D5}" type="datetimeFigureOut">
               <a:rPr lang="en-US" smtClean="0"/>
-              <a:t>5/13/15</a:t>
+              <a:t>5/18/15</a:t>
             </a:fld>
             <a:endParaRPr lang="en-US"/>
           </a:p>
@@ -2097,7 +2097,7 @@
           <a:p>
             <a:fld id="{D968744C-CFB2-7D43-BF8E-20D9B6CB77D5}" type="datetimeFigureOut">
               <a:rPr lang="en-US" smtClean="0"/>
-              <a:t>5/13/15</a:t>
+              <a:t>5/18/15</a:t>
             </a:fld>
             <a:endParaRPr lang="en-US"/>
           </a:p>
@@ -2519,7 +2519,7 @@
           <a:p>
             <a:fld id="{D968744C-CFB2-7D43-BF8E-20D9B6CB77D5}" type="datetimeFigureOut">
               <a:rPr lang="en-US" smtClean="0"/>
-              <a:t>5/13/15</a:t>
+              <a:t>5/18/15</a:t>
             </a:fld>
             <a:endParaRPr lang="en-US"/>
           </a:p>
@@ -2637,7 +2637,7 @@
           <a:p>
             <a:fld id="{D968744C-CFB2-7D43-BF8E-20D9B6CB77D5}" type="datetimeFigureOut">
               <a:rPr lang="en-US" smtClean="0"/>
-              <a:t>5/13/15</a:t>
+              <a:t>5/18/15</a:t>
             </a:fld>
             <a:endParaRPr lang="en-US"/>
           </a:p>
@@ -2732,7 +2732,7 @@
           <a:p>
             <a:fld id="{D968744C-CFB2-7D43-BF8E-20D9B6CB77D5}" type="datetimeFigureOut">
               <a:rPr lang="en-US" smtClean="0"/>
-              <a:t>5/13/15</a:t>
+              <a:t>5/18/15</a:t>
             </a:fld>
             <a:endParaRPr lang="en-US"/>
           </a:p>
@@ -3009,7 +3009,7 @@
           <a:p>
             <a:fld id="{D968744C-CFB2-7D43-BF8E-20D9B6CB77D5}" type="datetimeFigureOut">
               <a:rPr lang="en-US" smtClean="0"/>
-              <a:t>5/13/15</a:t>
+              <a:t>5/18/15</a:t>
             </a:fld>
             <a:endParaRPr lang="en-US"/>
           </a:p>
@@ -3262,7 +3262,7 @@
           <a:p>
             <a:fld id="{D968744C-CFB2-7D43-BF8E-20D9B6CB77D5}" type="datetimeFigureOut">
               <a:rPr lang="en-US" smtClean="0"/>
-              <a:t>5/13/15</a:t>
+              <a:t>5/18/15</a:t>
             </a:fld>
             <a:endParaRPr lang="en-US"/>
           </a:p>
@@ -3475,7 +3475,7 @@
           <a:p>
             <a:fld id="{D968744C-CFB2-7D43-BF8E-20D9B6CB77D5}" type="datetimeFigureOut">
               <a:rPr lang="en-US" smtClean="0"/>
-              <a:t>5/13/15</a:t>
+              <a:t>5/18/15</a:t>
             </a:fld>
             <a:endParaRPr lang="en-US"/>
           </a:p>
@@ -4813,7 +4813,7 @@
           </a:bodyPr>
           <a:lstStyle/>
           <a:p>
-            <a:pPr algn="just">
+            <a:pPr>
               <a:lnSpc>
                 <a:spcPct val="90000"/>
               </a:lnSpc>
@@ -4823,11 +4823,11 @@
                 <a:latin typeface="Helvetica"/>
                 <a:cs typeface="Helvetica"/>
               </a:rPr>
-              <a:t>Metadata</a:t>
-            </a:r>
-          </a:p>
-          <a:p>
-            <a:pPr algn="just">
+              <a:t>Making the Connection</a:t>
+            </a:r>
+          </a:p>
+          <a:p>
+            <a:pPr>
               <a:lnSpc>
                 <a:spcPct val="90000"/>
               </a:lnSpc>

</xml_diff>